<commit_message>
up up date date
</commit_message>
<xml_diff>
--- a/GameDev3.pptx
+++ b/GameDev3.pptx
@@ -156,7 +156,7 @@
           </a:lstStyle>
           <a:p>
             <a:r>
-              <a:rPr lang="en-US" smtClean="0"/>
+              <a:rPr lang="en-US"/>
               <a:t>Click to edit Master title style</a:t>
             </a:r>
             <a:endParaRPr lang="en-GB"/>
@@ -221,7 +221,7 @@
           </a:lstStyle>
           <a:p>
             <a:r>
-              <a:rPr lang="en-US" smtClean="0"/>
+              <a:rPr lang="en-US"/>
               <a:t>Click to edit Master subtitle style</a:t>
             </a:r>
             <a:endParaRPr lang="en-GB"/>
@@ -245,7 +245,7 @@
           <a:p>
             <a:fld id="{10B4BF6E-FB60-4BEC-8FCC-93327C769C89}" type="datetimeFigureOut">
               <a:rPr lang="en-GB" smtClean="0"/>
-              <a:t>08/09/2018</a:t>
+              <a:t>19/10/2018</a:t>
             </a:fld>
             <a:endParaRPr lang="en-GB"/>
           </a:p>
@@ -339,7 +339,7 @@
           <a:lstStyle/>
           <a:p>
             <a:r>
-              <a:rPr lang="en-US" smtClean="0"/>
+              <a:rPr lang="en-US"/>
               <a:t>Click to edit Master title style</a:t>
             </a:r>
             <a:endParaRPr lang="en-GB"/>
@@ -363,35 +363,35 @@
           <a:p>
             <a:pPr lvl="0"/>
             <a:r>
-              <a:rPr lang="en-US" smtClean="0"/>
+              <a:rPr lang="en-US"/>
               <a:t>Click to edit Master text styles</a:t>
             </a:r>
           </a:p>
           <a:p>
             <a:pPr lvl="1"/>
             <a:r>
-              <a:rPr lang="en-US" smtClean="0"/>
+              <a:rPr lang="en-US"/>
               <a:t>Second level</a:t>
             </a:r>
           </a:p>
           <a:p>
             <a:pPr lvl="2"/>
             <a:r>
-              <a:rPr lang="en-US" smtClean="0"/>
+              <a:rPr lang="en-US"/>
               <a:t>Third level</a:t>
             </a:r>
           </a:p>
           <a:p>
             <a:pPr lvl="3"/>
             <a:r>
-              <a:rPr lang="en-US" smtClean="0"/>
+              <a:rPr lang="en-US"/>
               <a:t>Fourth level</a:t>
             </a:r>
           </a:p>
           <a:p>
             <a:pPr lvl="4"/>
             <a:r>
-              <a:rPr lang="en-US" smtClean="0"/>
+              <a:rPr lang="en-US"/>
               <a:t>Fifth level</a:t>
             </a:r>
             <a:endParaRPr lang="en-GB"/>
@@ -415,7 +415,7 @@
           <a:p>
             <a:fld id="{10B4BF6E-FB60-4BEC-8FCC-93327C769C89}" type="datetimeFigureOut">
               <a:rPr lang="en-GB" smtClean="0"/>
-              <a:t>08/09/2018</a:t>
+              <a:t>19/10/2018</a:t>
             </a:fld>
             <a:endParaRPr lang="en-GB"/>
           </a:p>
@@ -514,7 +514,7 @@
           <a:lstStyle/>
           <a:p>
             <a:r>
-              <a:rPr lang="en-US" smtClean="0"/>
+              <a:rPr lang="en-US"/>
               <a:t>Click to edit Master title style</a:t>
             </a:r>
             <a:endParaRPr lang="en-GB"/>
@@ -543,35 +543,35 @@
           <a:p>
             <a:pPr lvl="0"/>
             <a:r>
-              <a:rPr lang="en-US" smtClean="0"/>
+              <a:rPr lang="en-US"/>
               <a:t>Click to edit Master text styles</a:t>
             </a:r>
           </a:p>
           <a:p>
             <a:pPr lvl="1"/>
             <a:r>
-              <a:rPr lang="en-US" smtClean="0"/>
+              <a:rPr lang="en-US"/>
               <a:t>Second level</a:t>
             </a:r>
           </a:p>
           <a:p>
             <a:pPr lvl="2"/>
             <a:r>
-              <a:rPr lang="en-US" smtClean="0"/>
+              <a:rPr lang="en-US"/>
               <a:t>Third level</a:t>
             </a:r>
           </a:p>
           <a:p>
             <a:pPr lvl="3"/>
             <a:r>
-              <a:rPr lang="en-US" smtClean="0"/>
+              <a:rPr lang="en-US"/>
               <a:t>Fourth level</a:t>
             </a:r>
           </a:p>
           <a:p>
             <a:pPr lvl="4"/>
             <a:r>
-              <a:rPr lang="en-US" smtClean="0"/>
+              <a:rPr lang="en-US"/>
               <a:t>Fifth level</a:t>
             </a:r>
             <a:endParaRPr lang="en-GB"/>
@@ -595,7 +595,7 @@
           <a:p>
             <a:fld id="{10B4BF6E-FB60-4BEC-8FCC-93327C769C89}" type="datetimeFigureOut">
               <a:rPr lang="en-GB" smtClean="0"/>
-              <a:t>08/09/2018</a:t>
+              <a:t>19/10/2018</a:t>
             </a:fld>
             <a:endParaRPr lang="en-GB"/>
           </a:p>
@@ -689,7 +689,7 @@
           <a:lstStyle/>
           <a:p>
             <a:r>
-              <a:rPr lang="en-US" smtClean="0"/>
+              <a:rPr lang="en-US"/>
               <a:t>Click to edit Master title style</a:t>
             </a:r>
             <a:endParaRPr lang="en-GB"/>
@@ -713,35 +713,35 @@
           <a:p>
             <a:pPr lvl="0"/>
             <a:r>
-              <a:rPr lang="en-US" smtClean="0"/>
+              <a:rPr lang="en-US"/>
               <a:t>Click to edit Master text styles</a:t>
             </a:r>
           </a:p>
           <a:p>
             <a:pPr lvl="1"/>
             <a:r>
-              <a:rPr lang="en-US" smtClean="0"/>
+              <a:rPr lang="en-US"/>
               <a:t>Second level</a:t>
             </a:r>
           </a:p>
           <a:p>
             <a:pPr lvl="2"/>
             <a:r>
-              <a:rPr lang="en-US" smtClean="0"/>
+              <a:rPr lang="en-US"/>
               <a:t>Third level</a:t>
             </a:r>
           </a:p>
           <a:p>
             <a:pPr lvl="3"/>
             <a:r>
-              <a:rPr lang="en-US" smtClean="0"/>
+              <a:rPr lang="en-US"/>
               <a:t>Fourth level</a:t>
             </a:r>
           </a:p>
           <a:p>
             <a:pPr lvl="4"/>
             <a:r>
-              <a:rPr lang="en-US" smtClean="0"/>
+              <a:rPr lang="en-US"/>
               <a:t>Fifth level</a:t>
             </a:r>
             <a:endParaRPr lang="en-GB"/>
@@ -765,7 +765,7 @@
           <a:p>
             <a:fld id="{10B4BF6E-FB60-4BEC-8FCC-93327C769C89}" type="datetimeFigureOut">
               <a:rPr lang="en-GB" smtClean="0"/>
-              <a:t>08/09/2018</a:t>
+              <a:t>19/10/2018</a:t>
             </a:fld>
             <a:endParaRPr lang="en-GB"/>
           </a:p>
@@ -868,7 +868,7 @@
           </a:lstStyle>
           <a:p>
             <a:r>
-              <a:rPr lang="en-US" smtClean="0"/>
+              <a:rPr lang="en-US"/>
               <a:t>Click to edit Master title style</a:t>
             </a:r>
             <a:endParaRPr lang="en-GB"/>
@@ -988,7 +988,7 @@
           <a:p>
             <a:pPr lvl="0"/>
             <a:r>
-              <a:rPr lang="en-US" smtClean="0"/>
+              <a:rPr lang="en-US"/>
               <a:t>Click to edit Master text styles</a:t>
             </a:r>
           </a:p>
@@ -1011,7 +1011,7 @@
           <a:p>
             <a:fld id="{10B4BF6E-FB60-4BEC-8FCC-93327C769C89}" type="datetimeFigureOut">
               <a:rPr lang="en-GB" smtClean="0"/>
-              <a:t>08/09/2018</a:t>
+              <a:t>19/10/2018</a:t>
             </a:fld>
             <a:endParaRPr lang="en-GB"/>
           </a:p>
@@ -1105,7 +1105,7 @@
           <a:lstStyle/>
           <a:p>
             <a:r>
-              <a:rPr lang="en-US" smtClean="0"/>
+              <a:rPr lang="en-US"/>
               <a:t>Click to edit Master title style</a:t>
             </a:r>
             <a:endParaRPr lang="en-GB"/>
@@ -1134,35 +1134,35 @@
           <a:p>
             <a:pPr lvl="0"/>
             <a:r>
-              <a:rPr lang="en-US" smtClean="0"/>
+              <a:rPr lang="en-US"/>
               <a:t>Click to edit Master text styles</a:t>
             </a:r>
           </a:p>
           <a:p>
             <a:pPr lvl="1"/>
             <a:r>
-              <a:rPr lang="en-US" smtClean="0"/>
+              <a:rPr lang="en-US"/>
               <a:t>Second level</a:t>
             </a:r>
           </a:p>
           <a:p>
             <a:pPr lvl="2"/>
             <a:r>
-              <a:rPr lang="en-US" smtClean="0"/>
+              <a:rPr lang="en-US"/>
               <a:t>Third level</a:t>
             </a:r>
           </a:p>
           <a:p>
             <a:pPr lvl="3"/>
             <a:r>
-              <a:rPr lang="en-US" smtClean="0"/>
+              <a:rPr lang="en-US"/>
               <a:t>Fourth level</a:t>
             </a:r>
           </a:p>
           <a:p>
             <a:pPr lvl="4"/>
             <a:r>
-              <a:rPr lang="en-US" smtClean="0"/>
+              <a:rPr lang="en-US"/>
               <a:t>Fifth level</a:t>
             </a:r>
             <a:endParaRPr lang="en-GB"/>
@@ -1191,35 +1191,35 @@
           <a:p>
             <a:pPr lvl="0"/>
             <a:r>
-              <a:rPr lang="en-US" smtClean="0"/>
+              <a:rPr lang="en-US"/>
               <a:t>Click to edit Master text styles</a:t>
             </a:r>
           </a:p>
           <a:p>
             <a:pPr lvl="1"/>
             <a:r>
-              <a:rPr lang="en-US" smtClean="0"/>
+              <a:rPr lang="en-US"/>
               <a:t>Second level</a:t>
             </a:r>
           </a:p>
           <a:p>
             <a:pPr lvl="2"/>
             <a:r>
-              <a:rPr lang="en-US" smtClean="0"/>
+              <a:rPr lang="en-US"/>
               <a:t>Third level</a:t>
             </a:r>
           </a:p>
           <a:p>
             <a:pPr lvl="3"/>
             <a:r>
-              <a:rPr lang="en-US" smtClean="0"/>
+              <a:rPr lang="en-US"/>
               <a:t>Fourth level</a:t>
             </a:r>
           </a:p>
           <a:p>
             <a:pPr lvl="4"/>
             <a:r>
-              <a:rPr lang="en-US" smtClean="0"/>
+              <a:rPr lang="en-US"/>
               <a:t>Fifth level</a:t>
             </a:r>
             <a:endParaRPr lang="en-GB"/>
@@ -1243,7 +1243,7 @@
           <a:p>
             <a:fld id="{10B4BF6E-FB60-4BEC-8FCC-93327C769C89}" type="datetimeFigureOut">
               <a:rPr lang="en-GB" smtClean="0"/>
-              <a:t>08/09/2018</a:t>
+              <a:t>19/10/2018</a:t>
             </a:fld>
             <a:endParaRPr lang="en-GB"/>
           </a:p>
@@ -1342,7 +1342,7 @@
           <a:lstStyle/>
           <a:p>
             <a:r>
-              <a:rPr lang="en-US" smtClean="0"/>
+              <a:rPr lang="en-US"/>
               <a:t>Click to edit Master title style</a:t>
             </a:r>
             <a:endParaRPr lang="en-GB"/>
@@ -1408,7 +1408,7 @@
           <a:p>
             <a:pPr lvl="0"/>
             <a:r>
-              <a:rPr lang="en-US" smtClean="0"/>
+              <a:rPr lang="en-US"/>
               <a:t>Click to edit Master text styles</a:t>
             </a:r>
           </a:p>
@@ -1436,35 +1436,35 @@
           <a:p>
             <a:pPr lvl="0"/>
             <a:r>
-              <a:rPr lang="en-US" smtClean="0"/>
+              <a:rPr lang="en-US"/>
               <a:t>Click to edit Master text styles</a:t>
             </a:r>
           </a:p>
           <a:p>
             <a:pPr lvl="1"/>
             <a:r>
-              <a:rPr lang="en-US" smtClean="0"/>
+              <a:rPr lang="en-US"/>
               <a:t>Second level</a:t>
             </a:r>
           </a:p>
           <a:p>
             <a:pPr lvl="2"/>
             <a:r>
-              <a:rPr lang="en-US" smtClean="0"/>
+              <a:rPr lang="en-US"/>
               <a:t>Third level</a:t>
             </a:r>
           </a:p>
           <a:p>
             <a:pPr lvl="3"/>
             <a:r>
-              <a:rPr lang="en-US" smtClean="0"/>
+              <a:rPr lang="en-US"/>
               <a:t>Fourth level</a:t>
             </a:r>
           </a:p>
           <a:p>
             <a:pPr lvl="4"/>
             <a:r>
-              <a:rPr lang="en-US" smtClean="0"/>
+              <a:rPr lang="en-US"/>
               <a:t>Fifth level</a:t>
             </a:r>
             <a:endParaRPr lang="en-GB"/>
@@ -1530,7 +1530,7 @@
           <a:p>
             <a:pPr lvl="0"/>
             <a:r>
-              <a:rPr lang="en-US" smtClean="0"/>
+              <a:rPr lang="en-US"/>
               <a:t>Click to edit Master text styles</a:t>
             </a:r>
           </a:p>
@@ -1558,35 +1558,35 @@
           <a:p>
             <a:pPr lvl="0"/>
             <a:r>
-              <a:rPr lang="en-US" smtClean="0"/>
+              <a:rPr lang="en-US"/>
               <a:t>Click to edit Master text styles</a:t>
             </a:r>
           </a:p>
           <a:p>
             <a:pPr lvl="1"/>
             <a:r>
-              <a:rPr lang="en-US" smtClean="0"/>
+              <a:rPr lang="en-US"/>
               <a:t>Second level</a:t>
             </a:r>
           </a:p>
           <a:p>
             <a:pPr lvl="2"/>
             <a:r>
-              <a:rPr lang="en-US" smtClean="0"/>
+              <a:rPr lang="en-US"/>
               <a:t>Third level</a:t>
             </a:r>
           </a:p>
           <a:p>
             <a:pPr lvl="3"/>
             <a:r>
-              <a:rPr lang="en-US" smtClean="0"/>
+              <a:rPr lang="en-US"/>
               <a:t>Fourth level</a:t>
             </a:r>
           </a:p>
           <a:p>
             <a:pPr lvl="4"/>
             <a:r>
-              <a:rPr lang="en-US" smtClean="0"/>
+              <a:rPr lang="en-US"/>
               <a:t>Fifth level</a:t>
             </a:r>
             <a:endParaRPr lang="en-GB"/>
@@ -1610,7 +1610,7 @@
           <a:p>
             <a:fld id="{10B4BF6E-FB60-4BEC-8FCC-93327C769C89}" type="datetimeFigureOut">
               <a:rPr lang="en-GB" smtClean="0"/>
-              <a:t>08/09/2018</a:t>
+              <a:t>19/10/2018</a:t>
             </a:fld>
             <a:endParaRPr lang="en-GB"/>
           </a:p>
@@ -1704,7 +1704,7 @@
           <a:lstStyle/>
           <a:p>
             <a:r>
-              <a:rPr lang="en-US" smtClean="0"/>
+              <a:rPr lang="en-US"/>
               <a:t>Click to edit Master title style</a:t>
             </a:r>
             <a:endParaRPr lang="en-GB"/>
@@ -1728,7 +1728,7 @@
           <a:p>
             <a:fld id="{10B4BF6E-FB60-4BEC-8FCC-93327C769C89}" type="datetimeFigureOut">
               <a:rPr lang="en-GB" smtClean="0"/>
-              <a:t>08/09/2018</a:t>
+              <a:t>19/10/2018</a:t>
             </a:fld>
             <a:endParaRPr lang="en-GB"/>
           </a:p>
@@ -1823,7 +1823,7 @@
           <a:p>
             <a:fld id="{10B4BF6E-FB60-4BEC-8FCC-93327C769C89}" type="datetimeFigureOut">
               <a:rPr lang="en-GB" smtClean="0"/>
-              <a:t>08/09/2018</a:t>
+              <a:t>19/10/2018</a:t>
             </a:fld>
             <a:endParaRPr lang="en-GB"/>
           </a:p>
@@ -1926,7 +1926,7 @@
           </a:lstStyle>
           <a:p>
             <a:r>
-              <a:rPr lang="en-US" smtClean="0"/>
+              <a:rPr lang="en-US"/>
               <a:t>Click to edit Master title style</a:t>
             </a:r>
             <a:endParaRPr lang="en-GB"/>
@@ -1983,35 +1983,35 @@
           <a:p>
             <a:pPr lvl="0"/>
             <a:r>
-              <a:rPr lang="en-US" smtClean="0"/>
+              <a:rPr lang="en-US"/>
               <a:t>Click to edit Master text styles</a:t>
             </a:r>
           </a:p>
           <a:p>
             <a:pPr lvl="1"/>
             <a:r>
-              <a:rPr lang="en-US" smtClean="0"/>
+              <a:rPr lang="en-US"/>
               <a:t>Second level</a:t>
             </a:r>
           </a:p>
           <a:p>
             <a:pPr lvl="2"/>
             <a:r>
-              <a:rPr lang="en-US" smtClean="0"/>
+              <a:rPr lang="en-US"/>
               <a:t>Third level</a:t>
             </a:r>
           </a:p>
           <a:p>
             <a:pPr lvl="3"/>
             <a:r>
-              <a:rPr lang="en-US" smtClean="0"/>
+              <a:rPr lang="en-US"/>
               <a:t>Fourth level</a:t>
             </a:r>
           </a:p>
           <a:p>
             <a:pPr lvl="4"/>
             <a:r>
-              <a:rPr lang="en-US" smtClean="0"/>
+              <a:rPr lang="en-US"/>
               <a:t>Fifth level</a:t>
             </a:r>
             <a:endParaRPr lang="en-GB"/>
@@ -2077,7 +2077,7 @@
           <a:p>
             <a:pPr lvl="0"/>
             <a:r>
-              <a:rPr lang="en-US" smtClean="0"/>
+              <a:rPr lang="en-US"/>
               <a:t>Click to edit Master text styles</a:t>
             </a:r>
           </a:p>
@@ -2100,7 +2100,7 @@
           <a:p>
             <a:fld id="{10B4BF6E-FB60-4BEC-8FCC-93327C769C89}" type="datetimeFigureOut">
               <a:rPr lang="en-GB" smtClean="0"/>
-              <a:t>08/09/2018</a:t>
+              <a:t>19/10/2018</a:t>
             </a:fld>
             <a:endParaRPr lang="en-GB"/>
           </a:p>
@@ -2203,7 +2203,7 @@
           </a:lstStyle>
           <a:p>
             <a:r>
-              <a:rPr lang="en-US" smtClean="0"/>
+              <a:rPr lang="en-US"/>
               <a:t>Click to edit Master title style</a:t>
             </a:r>
             <a:endParaRPr lang="en-GB"/>
@@ -2330,7 +2330,7 @@
           <a:p>
             <a:pPr lvl="0"/>
             <a:r>
-              <a:rPr lang="en-US" smtClean="0"/>
+              <a:rPr lang="en-US"/>
               <a:t>Click to edit Master text styles</a:t>
             </a:r>
           </a:p>
@@ -2353,7 +2353,7 @@
           <a:p>
             <a:fld id="{10B4BF6E-FB60-4BEC-8FCC-93327C769C89}" type="datetimeFigureOut">
               <a:rPr lang="en-GB" smtClean="0"/>
-              <a:t>08/09/2018</a:t>
+              <a:t>19/10/2018</a:t>
             </a:fld>
             <a:endParaRPr lang="en-GB"/>
           </a:p>
@@ -2462,7 +2462,7 @@
           <a:lstStyle/>
           <a:p>
             <a:r>
-              <a:rPr lang="en-US" smtClean="0"/>
+              <a:rPr lang="en-US"/>
               <a:t>Click to edit Master title style</a:t>
             </a:r>
             <a:endParaRPr lang="en-GB"/>
@@ -2496,35 +2496,35 @@
           <a:p>
             <a:pPr lvl="0"/>
             <a:r>
-              <a:rPr lang="en-US" smtClean="0"/>
+              <a:rPr lang="en-US"/>
               <a:t>Click to edit Master text styles</a:t>
             </a:r>
           </a:p>
           <a:p>
             <a:pPr lvl="1"/>
             <a:r>
-              <a:rPr lang="en-US" smtClean="0"/>
+              <a:rPr lang="en-US"/>
               <a:t>Second level</a:t>
             </a:r>
           </a:p>
           <a:p>
             <a:pPr lvl="2"/>
             <a:r>
-              <a:rPr lang="en-US" smtClean="0"/>
+              <a:rPr lang="en-US"/>
               <a:t>Third level</a:t>
             </a:r>
           </a:p>
           <a:p>
             <a:pPr lvl="3"/>
             <a:r>
-              <a:rPr lang="en-US" smtClean="0"/>
+              <a:rPr lang="en-US"/>
               <a:t>Fourth level</a:t>
             </a:r>
           </a:p>
           <a:p>
             <a:pPr lvl="4"/>
             <a:r>
-              <a:rPr lang="en-US" smtClean="0"/>
+              <a:rPr lang="en-US"/>
               <a:t>Fifth level</a:t>
             </a:r>
             <a:endParaRPr lang="en-GB"/>
@@ -2566,7 +2566,7 @@
           <a:p>
             <a:fld id="{10B4BF6E-FB60-4BEC-8FCC-93327C769C89}" type="datetimeFigureOut">
               <a:rPr lang="en-GB" smtClean="0"/>
-              <a:t>08/09/2018</a:t>
+              <a:t>19/10/2018</a:t>
             </a:fld>
             <a:endParaRPr lang="en-GB"/>
           </a:p>
@@ -2976,7 +2976,7 @@
           <p:cNvPr id="4" name="Picture 3">
             <a:extLst>
               <a:ext uri="{FF2B5EF4-FFF2-40B4-BE49-F238E27FC236}">
-                <a16:creationId xmlns:a16="http://schemas.microsoft.com/office/drawing/2014/main" xmlns="" id="{D8DE8787-99E2-4594-B4BA-A5310B76D6C4}"/>
+                <a16:creationId xmlns:a16="http://schemas.microsoft.com/office/drawing/2014/main" id="{D8DE8787-99E2-4594-B4BA-A5310B76D6C4}"/>
               </a:ext>
             </a:extLst>
           </p:cNvPr>
@@ -3012,7 +3012,7 @@
           <p:cNvPr id="5" name="TextBox 4">
             <a:extLst>
               <a:ext uri="{FF2B5EF4-FFF2-40B4-BE49-F238E27FC236}">
-                <a16:creationId xmlns:a16="http://schemas.microsoft.com/office/drawing/2014/main" xmlns="" id="{EDD3211B-6860-4EF2-9330-F894720F6211}"/>
+                <a16:creationId xmlns:a16="http://schemas.microsoft.com/office/drawing/2014/main" id="{EDD3211B-6860-4EF2-9330-F894720F6211}"/>
               </a:ext>
             </a:extLst>
           </p:cNvPr>
@@ -3037,7 +3037,7 @@
           <a:p>
             <a:pPr algn="ctr"/>
             <a:r>
-              <a:rPr lang="en-GB" sz="4800" dirty="0" smtClean="0">
+              <a:rPr lang="en-GB" sz="4800" dirty="0">
                 <a:solidFill>
                   <a:schemeClr val="bg1"/>
                 </a:solidFill>
@@ -3045,12 +3045,6 @@
               </a:rPr>
               <a:t>More Unity</a:t>
             </a:r>
-            <a:endParaRPr lang="en-GB" sz="4800" dirty="0">
-              <a:solidFill>
-                <a:schemeClr val="bg1"/>
-              </a:solidFill>
-              <a:latin typeface="VCR OSD Mono" panose="02000609000000000000" pitchFamily="49" charset="0"/>
-            </a:endParaRPr>
           </a:p>
         </p:txBody>
       </p:sp>
@@ -3100,10 +3094,9 @@
           <a:lstStyle/>
           <a:p>
             <a:r>
-              <a:rPr lang="en-GB" dirty="0" smtClean="0"/>
+              <a:rPr lang="en-GB" dirty="0"/>
               <a:t>UI</a:t>
             </a:r>
-            <a:endParaRPr lang="en-GB" dirty="0"/>
           </a:p>
         </p:txBody>
       </p:sp>
@@ -3130,7 +3123,7 @@
           <a:lstStyle/>
           <a:p>
             <a:r>
-              <a:rPr lang="en-GB" dirty="0" smtClean="0">
+              <a:rPr lang="en-GB" dirty="0">
                 <a:solidFill>
                   <a:srgbClr val="0000FF"/>
                 </a:solidFill>
@@ -3139,7 +3132,7 @@
               <a:t>using</a:t>
             </a:r>
             <a:r>
-              <a:rPr lang="en-GB" dirty="0" smtClean="0">
+              <a:rPr lang="en-GB" dirty="0">
                 <a:solidFill>
                   <a:srgbClr val="000000"/>
                 </a:solidFill>
@@ -3148,7 +3141,7 @@
               <a:t> </a:t>
             </a:r>
             <a:r>
-              <a:rPr lang="en-GB" dirty="0" err="1" smtClean="0">
+              <a:rPr lang="en-GB" dirty="0" err="1">
                 <a:solidFill>
                   <a:srgbClr val="000000"/>
                 </a:solidFill>
@@ -3157,7 +3150,7 @@
               <a:t>UnityEngine.UI</a:t>
             </a:r>
             <a:r>
-              <a:rPr lang="en-GB" dirty="0" smtClean="0">
+              <a:rPr lang="en-GB" dirty="0">
                 <a:solidFill>
                   <a:srgbClr val="000000"/>
                 </a:solidFill>
@@ -3190,7 +3183,7 @@
           </a:bodyPr>
           <a:lstStyle/>
           <a:p>
-            <a:endParaRPr lang="en-GB" b="0" i="0" dirty="0" smtClean="0">
+            <a:endParaRPr lang="en-GB" b="0" i="0" dirty="0">
               <a:solidFill>
                 <a:srgbClr val="333333"/>
               </a:solidFill>
@@ -3200,7 +3193,7 @@
           </a:p>
           <a:p>
             <a:r>
-              <a:rPr lang="en-GB" smtClean="0">
+              <a:rPr lang="en-GB">
                 <a:solidFill>
                   <a:srgbClr val="333333"/>
                 </a:solidFill>
@@ -3209,7 +3202,7 @@
               <a:t>Text </a:t>
             </a:r>
             <a:r>
-              <a:rPr lang="en-GB" b="0" i="0" dirty="0" err="1" smtClean="0">
+              <a:rPr lang="en-GB" b="0" i="0" dirty="0" err="1">
                 <a:solidFill>
                   <a:srgbClr val="333333"/>
                 </a:solidFill>
@@ -3219,7 +3212,7 @@
               <a:t>scoreText</a:t>
             </a:r>
             <a:r>
-              <a:rPr lang="en-GB" b="0" i="0" dirty="0" smtClean="0">
+              <a:rPr lang="en-GB" b="0" i="0" dirty="0">
                 <a:solidFill>
                   <a:srgbClr val="333333"/>
                 </a:solidFill>
@@ -3229,7 +3222,7 @@
               <a:t> </a:t>
             </a:r>
             <a:r>
-              <a:rPr lang="en-GB" b="0" i="0" dirty="0" smtClean="0">
+              <a:rPr lang="en-GB" b="0" i="0" dirty="0">
                 <a:solidFill>
                   <a:srgbClr val="008000"/>
                 </a:solidFill>
@@ -3239,7 +3232,7 @@
               <a:t>=</a:t>
             </a:r>
             <a:r>
-              <a:rPr lang="en-GB" b="0" i="0" dirty="0" smtClean="0">
+              <a:rPr lang="en-GB" b="0" i="0" dirty="0">
                 <a:solidFill>
                   <a:srgbClr val="333333"/>
                 </a:solidFill>
@@ -3249,7 +3242,7 @@
               <a:t> </a:t>
             </a:r>
             <a:r>
-              <a:rPr lang="en-GB" b="0" i="0" dirty="0" err="1" smtClean="0">
+              <a:rPr lang="en-GB" b="0" i="0" dirty="0" err="1">
                 <a:solidFill>
                   <a:srgbClr val="333333"/>
                 </a:solidFill>
@@ -3259,7 +3252,7 @@
               <a:t>GameObject</a:t>
             </a:r>
             <a:r>
-              <a:rPr lang="en-GB" b="0" i="0" dirty="0" err="1" smtClean="0">
+              <a:rPr lang="en-GB" b="0" i="0" dirty="0" err="1">
                 <a:solidFill>
                   <a:srgbClr val="008000"/>
                 </a:solidFill>
@@ -3269,7 +3262,7 @@
               <a:t>.</a:t>
             </a:r>
             <a:r>
-              <a:rPr lang="en-GB" b="0" i="0" dirty="0" err="1" smtClean="0">
+              <a:rPr lang="en-GB" b="0" i="0" dirty="0" err="1">
                 <a:solidFill>
                   <a:srgbClr val="0000FF"/>
                 </a:solidFill>
@@ -3279,7 +3272,7 @@
               <a:t>Find</a:t>
             </a:r>
             <a:r>
-              <a:rPr lang="en-GB" b="0" i="0" dirty="0" smtClean="0">
+              <a:rPr lang="en-GB" b="0" i="0" dirty="0">
                 <a:solidFill>
                   <a:srgbClr val="008000"/>
                 </a:solidFill>
@@ -3289,7 +3282,7 @@
               <a:t>(</a:t>
             </a:r>
             <a:r>
-              <a:rPr lang="en-GB" b="0" i="0" dirty="0" smtClean="0">
+              <a:rPr lang="en-GB" b="0" i="0" dirty="0">
                 <a:solidFill>
                   <a:srgbClr val="666666"/>
                 </a:solidFill>
@@ -3299,7 +3292,7 @@
               <a:t>“</a:t>
             </a:r>
             <a:r>
-              <a:rPr lang="en-GB" b="0" i="0" dirty="0" err="1" smtClean="0">
+              <a:rPr lang="en-GB" b="0" i="0" dirty="0" err="1">
                 <a:solidFill>
                   <a:srgbClr val="666666"/>
                 </a:solidFill>
@@ -3309,7 +3302,7 @@
               <a:t>ScoreUI</a:t>
             </a:r>
             <a:r>
-              <a:rPr lang="en-GB" b="0" i="0" dirty="0" smtClean="0">
+              <a:rPr lang="en-GB" b="0" i="0" dirty="0">
                 <a:solidFill>
                   <a:srgbClr val="666666"/>
                 </a:solidFill>
@@ -3319,7 +3312,7 @@
               <a:t>"</a:t>
             </a:r>
             <a:r>
-              <a:rPr lang="en-GB" b="0" i="0" dirty="0" smtClean="0">
+              <a:rPr lang="en-GB" b="0" i="0" dirty="0">
                 <a:solidFill>
                   <a:srgbClr val="008000"/>
                 </a:solidFill>
@@ -3329,7 +3322,7 @@
               <a:t>).</a:t>
             </a:r>
             <a:r>
-              <a:rPr lang="en-GB" b="0" i="0" dirty="0" err="1" smtClean="0">
+              <a:rPr lang="en-GB" b="0" i="0" dirty="0" err="1">
                 <a:solidFill>
                   <a:srgbClr val="0000FF"/>
                 </a:solidFill>
@@ -3339,7 +3332,7 @@
               <a:t>GetComponent</a:t>
             </a:r>
             <a:r>
-              <a:rPr lang="en-GB" b="0" i="0" dirty="0" smtClean="0">
+              <a:rPr lang="en-GB" b="0" i="0" dirty="0">
                 <a:solidFill>
                   <a:srgbClr val="008000"/>
                 </a:solidFill>
@@ -3349,7 +3342,7 @@
               <a:t>&lt;</a:t>
             </a:r>
             <a:r>
-              <a:rPr lang="en-GB" b="0" i="0" dirty="0" smtClean="0">
+              <a:rPr lang="en-GB" b="0" i="0" dirty="0">
                 <a:solidFill>
                   <a:srgbClr val="333333"/>
                 </a:solidFill>
@@ -3359,7 +3352,7 @@
               <a:t>Text</a:t>
             </a:r>
             <a:r>
-              <a:rPr lang="en-GB" b="0" i="0" dirty="0" smtClean="0">
+              <a:rPr lang="en-GB" b="0" i="0" dirty="0">
                 <a:solidFill>
                   <a:srgbClr val="008000"/>
                 </a:solidFill>
@@ -3379,18 +3372,18 @@
           </a:p>
           <a:p>
             <a:r>
-              <a:rPr lang="en-GB" dirty="0" err="1" smtClean="0">
+              <a:rPr lang="en-GB" dirty="0" err="1">
                 <a:latin typeface="Courier New" panose="02070309020205020404" pitchFamily="49" charset="0"/>
               </a:rPr>
               <a:t>ScoreText.text</a:t>
             </a:r>
             <a:r>
-              <a:rPr lang="en-GB" dirty="0" smtClean="0">
+              <a:rPr lang="en-GB" dirty="0">
                 <a:latin typeface="Courier New" panose="02070309020205020404" pitchFamily="49" charset="0"/>
               </a:rPr>
               <a:t> = "Score";</a:t>
             </a:r>
-            <a:endParaRPr lang="en-GB" dirty="0" smtClean="0">
+            <a:endParaRPr lang="en-GB" dirty="0">
               <a:solidFill>
                 <a:srgbClr val="008000"/>
               </a:solidFill>
@@ -3398,7 +3391,7 @@
             </a:endParaRPr>
           </a:p>
           <a:p>
-            <a:endParaRPr lang="en-GB" dirty="0" smtClean="0">
+            <a:endParaRPr lang="en-GB" dirty="0">
               <a:solidFill>
                 <a:srgbClr val="008000"/>
               </a:solidFill>
@@ -3407,7 +3400,7 @@
           </a:p>
           <a:p>
             <a:r>
-              <a:rPr lang="en-GB" b="0" i="0" dirty="0" err="1" smtClean="0">
+              <a:rPr lang="en-GB" b="0" i="0" dirty="0" err="1">
                 <a:solidFill>
                   <a:srgbClr val="333333"/>
                 </a:solidFill>
@@ -3417,7 +3410,7 @@
               <a:t>GameObject</a:t>
             </a:r>
             <a:r>
-              <a:rPr lang="en-GB" b="0" i="0" dirty="0" err="1" smtClean="0">
+              <a:rPr lang="en-GB" b="0" i="0" dirty="0" err="1">
                 <a:solidFill>
                   <a:srgbClr val="008000"/>
                 </a:solidFill>
@@ -3427,7 +3420,7 @@
               <a:t>.</a:t>
             </a:r>
             <a:r>
-              <a:rPr lang="en-GB" b="0" i="0" dirty="0" err="1" smtClean="0">
+              <a:rPr lang="en-GB" b="0" i="0" dirty="0" err="1">
                 <a:solidFill>
                   <a:srgbClr val="0000FF"/>
                 </a:solidFill>
@@ -3437,7 +3430,7 @@
               <a:t>Find</a:t>
             </a:r>
             <a:r>
-              <a:rPr lang="en-GB" b="0" i="0" dirty="0" smtClean="0">
+              <a:rPr lang="en-GB" b="0" i="0" dirty="0">
                 <a:solidFill>
                   <a:srgbClr val="008000"/>
                 </a:solidFill>
@@ -3447,7 +3440,7 @@
               <a:t>(</a:t>
             </a:r>
             <a:r>
-              <a:rPr lang="en-GB" b="0" i="0" dirty="0" smtClean="0">
+              <a:rPr lang="en-GB" b="0" i="0" dirty="0">
                 <a:solidFill>
                   <a:srgbClr val="666666"/>
                 </a:solidFill>
@@ -3457,7 +3450,7 @@
               <a:t>“</a:t>
             </a:r>
             <a:r>
-              <a:rPr lang="en-GB" b="0" i="0" dirty="0" err="1" smtClean="0">
+              <a:rPr lang="en-GB" b="0" i="0" dirty="0" err="1">
                 <a:solidFill>
                   <a:srgbClr val="666666"/>
                 </a:solidFill>
@@ -3467,7 +3460,7 @@
               <a:t>ScoreUI</a:t>
             </a:r>
             <a:r>
-              <a:rPr lang="en-GB" b="0" i="0" dirty="0" smtClean="0">
+              <a:rPr lang="en-GB" b="0" i="0" dirty="0">
                 <a:solidFill>
                   <a:srgbClr val="666666"/>
                 </a:solidFill>
@@ -3477,7 +3470,7 @@
               <a:t>"</a:t>
             </a:r>
             <a:r>
-              <a:rPr lang="en-GB" b="0" i="0" dirty="0" smtClean="0">
+              <a:rPr lang="en-GB" b="0" i="0" dirty="0">
                 <a:solidFill>
                   <a:srgbClr val="008000"/>
                 </a:solidFill>
@@ -3487,14 +3480,14 @@
               <a:t>).</a:t>
             </a:r>
             <a:r>
-              <a:rPr lang="en-GB" b="0" i="0" dirty="0" err="1" smtClean="0">
+              <a:rPr lang="en-GB" b="0" i="0" dirty="0" err="1">
                 <a:effectLst/>
                 <a:latin typeface="Courier New" panose="02070309020205020404" pitchFamily="49" charset="0"/>
               </a:rPr>
               <a:t>SetActive</a:t>
             </a:r>
             <a:r>
-              <a:rPr lang="en-GB" b="0" i="0" dirty="0" smtClean="0">
+              <a:rPr lang="en-GB" b="0" i="0" dirty="0">
                 <a:solidFill>
                   <a:srgbClr val="008000"/>
                 </a:solidFill>
@@ -3605,22 +3598,13 @@
           </a:p>
           <a:p>
             <a:r>
-              <a:rPr lang="en-GB" dirty="0" smtClean="0">
+              <a:rPr lang="en-GB" dirty="0">
                 <a:solidFill>
                   <a:srgbClr val="455463"/>
                 </a:solidFill>
                 <a:latin typeface="Open Sans"/>
               </a:rPr>
-              <a:t>public </a:t>
-            </a:r>
-            <a:r>
-              <a:rPr lang="en-GB" dirty="0">
-                <a:solidFill>
-                  <a:srgbClr val="455463"/>
-                </a:solidFill>
-                <a:latin typeface="Open Sans"/>
-              </a:rPr>
-              <a:t>static void </a:t>
+              <a:t>public static void </a:t>
             </a:r>
             <a:r>
               <a:rPr lang="en-GB" b="1" dirty="0" err="1">

</xml_diff>